<commit_message>
Updates, Testing, & CI
</commit_message>
<xml_diff>
--- a/docs/Pypsm.pptx
+++ b/docs/Pypsm.pptx
@@ -5,14 +5,17 @@
     <p:sldMasterId id="2147483660" r:id="rId4"/>
   </p:sldMasterIdLst>
   <p:notesMasterIdLst>
-    <p:notesMasterId r:id="rId10"/>
+    <p:notesMasterId r:id="rId13"/>
   </p:notesMasterIdLst>
   <p:sldIdLst>
     <p:sldId id="264" r:id="rId5"/>
     <p:sldId id="312" r:id="rId6"/>
     <p:sldId id="313" r:id="rId7"/>
     <p:sldId id="314" r:id="rId8"/>
-    <p:sldId id="315" r:id="rId9"/>
+    <p:sldId id="318" r:id="rId9"/>
+    <p:sldId id="315" r:id="rId10"/>
+    <p:sldId id="316" r:id="rId11"/>
+    <p:sldId id="317" r:id="rId12"/>
   </p:sldIdLst>
   <p:sldSz cx="12192000" cy="6858000"/>
   <p:notesSz cx="6858000" cy="9144000"/>
@@ -5302,7 +5305,12 @@
             <p:ph idx="1"/>
           </p:nvPr>
         </p:nvSpPr>
-        <p:spPr/>
+        <p:spPr>
+          <a:xfrm>
+            <a:off x="1066800" y="2014194"/>
+            <a:ext cx="10058400" cy="3849624"/>
+          </a:xfrm>
+        </p:spPr>
         <p:txBody>
           <a:bodyPr>
             <a:normAutofit/>
@@ -5334,7 +5342,7 @@
           <a:p>
             <a:r>
               <a:rPr lang="en-US" sz="2000" dirty="0"/>
-              <a:t>Could make this more accessible with GUI and automatic data cleaning in the future</a:t>
+              <a:t>No simple way to do propensity score matching in packages such as scikit-learn</a:t>
             </a:r>
           </a:p>
         </p:txBody>
@@ -5436,6 +5444,136 @@
 </file>
 
 <file path=ppt/slides/slide5.xml><?xml version="1.0" encoding="utf-8"?>
+<p:sld xmlns:a="http://schemas.openxmlformats.org/drawingml/2006/main" xmlns:r="http://schemas.openxmlformats.org/officeDocument/2006/relationships" xmlns:p="http://schemas.openxmlformats.org/presentationml/2006/main">
+  <p:cSld>
+    <p:spTree>
+      <p:nvGrpSpPr>
+        <p:cNvPr id="1" name=""/>
+        <p:cNvGrpSpPr/>
+        <p:nvPr/>
+      </p:nvGrpSpPr>
+      <p:grpSpPr>
+        <a:xfrm>
+          <a:off x="0" y="0"/>
+          <a:ext cx="0" cy="0"/>
+          <a:chOff x="0" y="0"/>
+          <a:chExt cx="0" cy="0"/>
+        </a:xfrm>
+      </p:grpSpPr>
+      <p:sp>
+        <p:nvSpPr>
+          <p:cNvPr id="2" name="Title 1">
+            <a:extLst>
+              <a:ext uri="{FF2B5EF4-FFF2-40B4-BE49-F238E27FC236}">
+                <a16:creationId xmlns:a16="http://schemas.microsoft.com/office/drawing/2014/main" id="{7B227488-D81A-4B96-9B76-B148F60B5C97}"/>
+              </a:ext>
+            </a:extLst>
+          </p:cNvPr>
+          <p:cNvSpPr>
+            <a:spLocks noGrp="1"/>
+          </p:cNvSpPr>
+          <p:nvPr>
+            <p:ph type="title"/>
+          </p:nvPr>
+        </p:nvSpPr>
+        <p:spPr/>
+        <p:txBody>
+          <a:bodyPr/>
+          <a:lstStyle/>
+          <a:p>
+            <a:r>
+              <a:rPr lang="en-US" dirty="0"/>
+              <a:t>Design</a:t>
+            </a:r>
+          </a:p>
+        </p:txBody>
+      </p:sp>
+      <p:sp>
+        <p:nvSpPr>
+          <p:cNvPr id="3" name="Content Placeholder 2">
+            <a:extLst>
+              <a:ext uri="{FF2B5EF4-FFF2-40B4-BE49-F238E27FC236}">
+                <a16:creationId xmlns:a16="http://schemas.microsoft.com/office/drawing/2014/main" id="{700A1C61-1D7F-42DE-9356-4B43EE643148}"/>
+              </a:ext>
+            </a:extLst>
+          </p:cNvPr>
+          <p:cNvSpPr>
+            <a:spLocks noGrp="1"/>
+          </p:cNvSpPr>
+          <p:nvPr>
+            <p:ph idx="1"/>
+          </p:nvPr>
+        </p:nvSpPr>
+        <p:spPr/>
+        <p:txBody>
+          <a:bodyPr>
+            <a:normAutofit/>
+          </a:bodyPr>
+          <a:lstStyle/>
+          <a:p>
+            <a:r>
+              <a:rPr lang="en-US" sz="2000" dirty="0"/>
+              <a:t>Split into two main parts:</a:t>
+            </a:r>
+          </a:p>
+          <a:p>
+            <a:pPr lvl="1"/>
+            <a:r>
+              <a:rPr lang="en-US" sz="1800" dirty="0"/>
+              <a:t>match.py = wrapper function that reads in data (as </a:t>
+            </a:r>
+            <a:r>
+              <a:rPr lang="en-US" sz="1800" dirty="0" err="1"/>
+              <a:t>dataframe</a:t>
+            </a:r>
+            <a:r>
+              <a:rPr lang="en-US" sz="1800" dirty="0"/>
+              <a:t> or csv) and calls Matcher to create matched group </a:t>
+            </a:r>
+            <a:r>
+              <a:rPr lang="en-US" sz="1800" dirty="0" err="1"/>
+              <a:t>dataframe</a:t>
+            </a:r>
+            <a:endParaRPr lang="en-US" sz="1800" dirty="0"/>
+          </a:p>
+          <a:p>
+            <a:pPr lvl="1"/>
+            <a:r>
+              <a:rPr lang="en-US" sz="1800" dirty="0"/>
+              <a:t>Matcher.py = contains class Matcher that contains logic for matching</a:t>
+            </a:r>
+          </a:p>
+          <a:p>
+            <a:pPr lvl="2"/>
+            <a:r>
+              <a:rPr lang="en-US" sz="1700" dirty="0"/>
+              <a:t>Create Logistic Regression -&gt; Score Data -&gt; Match Data based </a:t>
+            </a:r>
+            <a:r>
+              <a:rPr lang="en-US" sz="1700"/>
+              <a:t>on Score</a:t>
+            </a:r>
+            <a:endParaRPr lang="en-US" sz="1700" dirty="0"/>
+          </a:p>
+          <a:p>
+            <a:endParaRPr lang="en-US" sz="2000" dirty="0"/>
+          </a:p>
+        </p:txBody>
+      </p:sp>
+    </p:spTree>
+    <p:extLst>
+      <p:ext uri="{BB962C8B-B14F-4D97-AF65-F5344CB8AC3E}">
+        <p14:creationId xmlns:p14="http://schemas.microsoft.com/office/powerpoint/2010/main" val="571771949"/>
+      </p:ext>
+    </p:extLst>
+  </p:cSld>
+  <p:clrMapOvr>
+    <a:masterClrMapping/>
+  </p:clrMapOvr>
+</p:sld>
+</file>
+
+<file path=ppt/slides/slide6.xml><?xml version="1.0" encoding="utf-8"?>
 <p:sld xmlns:a="http://schemas.openxmlformats.org/drawingml/2006/main" xmlns:r="http://schemas.openxmlformats.org/officeDocument/2006/relationships" xmlns:p="http://schemas.openxmlformats.org/presentationml/2006/main">
   <p:cSld>
     <p:spTree>
@@ -5588,6 +5726,221 @@
     <p:extLst>
       <p:ext uri="{BB962C8B-B14F-4D97-AF65-F5344CB8AC3E}">
         <p14:creationId xmlns:p14="http://schemas.microsoft.com/office/powerpoint/2010/main" val="826216781"/>
+      </p:ext>
+    </p:extLst>
+  </p:cSld>
+  <p:clrMapOvr>
+    <a:masterClrMapping/>
+  </p:clrMapOvr>
+</p:sld>
+</file>
+
+<file path=ppt/slides/slide7.xml><?xml version="1.0" encoding="utf-8"?>
+<p:sld xmlns:a="http://schemas.openxmlformats.org/drawingml/2006/main" xmlns:r="http://schemas.openxmlformats.org/officeDocument/2006/relationships" xmlns:p="http://schemas.openxmlformats.org/presentationml/2006/main">
+  <p:cSld>
+    <p:spTree>
+      <p:nvGrpSpPr>
+        <p:cNvPr id="1" name=""/>
+        <p:cNvGrpSpPr/>
+        <p:nvPr/>
+      </p:nvGrpSpPr>
+      <p:grpSpPr>
+        <a:xfrm>
+          <a:off x="0" y="0"/>
+          <a:ext cx="0" cy="0"/>
+          <a:chOff x="0" y="0"/>
+          <a:chExt cx="0" cy="0"/>
+        </a:xfrm>
+      </p:grpSpPr>
+      <p:sp>
+        <p:nvSpPr>
+          <p:cNvPr id="2" name="Title 1">
+            <a:extLst>
+              <a:ext uri="{FF2B5EF4-FFF2-40B4-BE49-F238E27FC236}">
+                <a16:creationId xmlns:a16="http://schemas.microsoft.com/office/drawing/2014/main" id="{3B1C84B1-BCBE-422A-AB90-06FED88DF817}"/>
+              </a:ext>
+            </a:extLst>
+          </p:cNvPr>
+          <p:cNvSpPr>
+            <a:spLocks noGrp="1"/>
+          </p:cNvSpPr>
+          <p:nvPr>
+            <p:ph type="title"/>
+          </p:nvPr>
+        </p:nvSpPr>
+        <p:spPr/>
+        <p:txBody>
+          <a:bodyPr/>
+          <a:lstStyle/>
+          <a:p>
+            <a:r>
+              <a:rPr lang="en-US"/>
+              <a:t>Project Structure</a:t>
+            </a:r>
+            <a:endParaRPr lang="en-US" dirty="0"/>
+          </a:p>
+        </p:txBody>
+      </p:sp>
+      <p:pic>
+        <p:nvPicPr>
+          <p:cNvPr id="9" name="Picture 8">
+            <a:extLst>
+              <a:ext uri="{FF2B5EF4-FFF2-40B4-BE49-F238E27FC236}">
+                <a16:creationId xmlns:a16="http://schemas.microsoft.com/office/drawing/2014/main" id="{52D8046C-F575-4D8A-BA5D-DDA3443103BC}"/>
+              </a:ext>
+            </a:extLst>
+          </p:cNvPr>
+          <p:cNvPicPr>
+            <a:picLocks noChangeAspect="1"/>
+          </p:cNvPicPr>
+          <p:nvPr/>
+        </p:nvPicPr>
+        <p:blipFill>
+          <a:blip r:embed="rId2"/>
+          <a:stretch>
+            <a:fillRect/>
+          </a:stretch>
+        </p:blipFill>
+        <p:spPr>
+          <a:xfrm>
+            <a:off x="1226450" y="2014194"/>
+            <a:ext cx="3867690" cy="3820058"/>
+          </a:xfrm>
+          <a:prstGeom prst="rect">
+            <a:avLst/>
+          </a:prstGeom>
+        </p:spPr>
+      </p:pic>
+    </p:spTree>
+    <p:extLst>
+      <p:ext uri="{BB962C8B-B14F-4D97-AF65-F5344CB8AC3E}">
+        <p14:creationId xmlns:p14="http://schemas.microsoft.com/office/powerpoint/2010/main" val="1588619495"/>
+      </p:ext>
+    </p:extLst>
+  </p:cSld>
+  <p:clrMapOvr>
+    <a:masterClrMapping/>
+  </p:clrMapOvr>
+</p:sld>
+</file>
+
+<file path=ppt/slides/slide8.xml><?xml version="1.0" encoding="utf-8"?>
+<p:sld xmlns:a="http://schemas.openxmlformats.org/drawingml/2006/main" xmlns:r="http://schemas.openxmlformats.org/officeDocument/2006/relationships" xmlns:p="http://schemas.openxmlformats.org/presentationml/2006/main">
+  <p:cSld>
+    <p:spTree>
+      <p:nvGrpSpPr>
+        <p:cNvPr id="1" name=""/>
+        <p:cNvGrpSpPr/>
+        <p:nvPr/>
+      </p:nvGrpSpPr>
+      <p:grpSpPr>
+        <a:xfrm>
+          <a:off x="0" y="0"/>
+          <a:ext cx="0" cy="0"/>
+          <a:chOff x="0" y="0"/>
+          <a:chExt cx="0" cy="0"/>
+        </a:xfrm>
+      </p:grpSpPr>
+      <p:sp>
+        <p:nvSpPr>
+          <p:cNvPr id="2" name="Title 1">
+            <a:extLst>
+              <a:ext uri="{FF2B5EF4-FFF2-40B4-BE49-F238E27FC236}">
+                <a16:creationId xmlns:a16="http://schemas.microsoft.com/office/drawing/2014/main" id="{55AC4AED-094E-4570-BF53-510170369FC2}"/>
+              </a:ext>
+            </a:extLst>
+          </p:cNvPr>
+          <p:cNvSpPr>
+            <a:spLocks noGrp="1"/>
+          </p:cNvSpPr>
+          <p:nvPr>
+            <p:ph type="title"/>
+          </p:nvPr>
+        </p:nvSpPr>
+        <p:spPr/>
+        <p:txBody>
+          <a:bodyPr/>
+          <a:lstStyle/>
+          <a:p>
+            <a:r>
+              <a:rPr lang="en-US" dirty="0"/>
+              <a:t>Lessons Learned &amp; Future Work</a:t>
+            </a:r>
+          </a:p>
+        </p:txBody>
+      </p:sp>
+      <p:sp>
+        <p:nvSpPr>
+          <p:cNvPr id="3" name="Content Placeholder 2">
+            <a:extLst>
+              <a:ext uri="{FF2B5EF4-FFF2-40B4-BE49-F238E27FC236}">
+                <a16:creationId xmlns:a16="http://schemas.microsoft.com/office/drawing/2014/main" id="{865EB48A-422A-4129-9B32-8833C41F7101}"/>
+              </a:ext>
+            </a:extLst>
+          </p:cNvPr>
+          <p:cNvSpPr>
+            <a:spLocks noGrp="1"/>
+          </p:cNvSpPr>
+          <p:nvPr>
+            <p:ph idx="1"/>
+          </p:nvPr>
+        </p:nvSpPr>
+        <p:spPr/>
+        <p:txBody>
+          <a:bodyPr>
+            <a:normAutofit/>
+          </a:bodyPr>
+          <a:lstStyle/>
+          <a:p>
+            <a:r>
+              <a:rPr lang="en-US" sz="2000" dirty="0"/>
+              <a:t>User-oriented design</a:t>
+            </a:r>
+          </a:p>
+          <a:p>
+            <a:pPr lvl="1"/>
+            <a:r>
+              <a:rPr lang="en-US" sz="1800" dirty="0"/>
+              <a:t>Figure out what exact functionality is needed</a:t>
+            </a:r>
+          </a:p>
+          <a:p>
+            <a:pPr lvl="1"/>
+            <a:r>
+              <a:rPr lang="en-US" sz="1800" dirty="0"/>
+              <a:t>Write function headers</a:t>
+            </a:r>
+          </a:p>
+          <a:p>
+            <a:r>
+              <a:rPr lang="en-US" sz="2000" dirty="0"/>
+              <a:t>Future Work</a:t>
+            </a:r>
+          </a:p>
+          <a:p>
+            <a:pPr lvl="1"/>
+            <a:r>
+              <a:rPr lang="en-US" sz="1800" dirty="0"/>
+              <a:t>GUI</a:t>
+            </a:r>
+          </a:p>
+          <a:p>
+            <a:pPr lvl="1"/>
+            <a:r>
+              <a:rPr lang="en-US" sz="1800" dirty="0"/>
+              <a:t>Automatic Data Cleaning</a:t>
+            </a:r>
+          </a:p>
+          <a:p>
+            <a:pPr lvl="1"/>
+            <a:endParaRPr lang="en-US" sz="1800" dirty="0"/>
+          </a:p>
+        </p:txBody>
+      </p:sp>
+    </p:spTree>
+    <p:extLst>
+      <p:ext uri="{BB962C8B-B14F-4D97-AF65-F5344CB8AC3E}">
+        <p14:creationId xmlns:p14="http://schemas.microsoft.com/office/powerpoint/2010/main" val="1074471295"/>
       </p:ext>
     </p:extLst>
   </p:cSld>
@@ -6255,12 +6608,12 @@
 </file>
 
 <file path=customXml/item1.xml><?xml version="1.0" encoding="utf-8"?>
-<p:properties xmlns:p="http://schemas.microsoft.com/office/2006/metadata/properties" xmlns:xsi="http://www.w3.org/2001/XMLSchema-instance" xmlns:pc="http://schemas.microsoft.com/office/infopath/2007/PartnerControls">
-  <documentManagement>
-    <Status xmlns="71af3243-3dd4-4a8d-8c0d-dd76da1f02a5">Not started</Status>
-    <MediaServiceKeyPoints xmlns="71af3243-3dd4-4a8d-8c0d-dd76da1f02a5" xsi:nil="true"/>
-  </documentManagement>
-</p:properties>
+<?mso-contentType ?>
+<FormTemplates xmlns="http://schemas.microsoft.com/sharepoint/v3/contenttype/forms">
+  <Display>DocumentLibraryForm</Display>
+  <Edit>DocumentLibraryForm</Edit>
+  <New>DocumentLibraryForm</New>
+</FormTemplates>
 </file>
 
 <file path=customXml/item2.xml><?xml version="1.0" encoding="utf-8"?>
@@ -6485,20 +6838,18 @@
 </file>
 
 <file path=customXml/item3.xml><?xml version="1.0" encoding="utf-8"?>
-<?mso-contentType ?>
-<FormTemplates xmlns="http://schemas.microsoft.com/sharepoint/v3/contenttype/forms">
-  <Display>DocumentLibraryForm</Display>
-  <Edit>DocumentLibraryForm</Edit>
-  <New>DocumentLibraryForm</New>
-</FormTemplates>
+<p:properties xmlns:p="http://schemas.microsoft.com/office/2006/metadata/properties" xmlns:xsi="http://www.w3.org/2001/XMLSchema-instance" xmlns:pc="http://schemas.microsoft.com/office/infopath/2007/PartnerControls">
+  <documentManagement>
+    <Status xmlns="71af3243-3dd4-4a8d-8c0d-dd76da1f02a5">Not started</Status>
+    <MediaServiceKeyPoints xmlns="71af3243-3dd4-4a8d-8c0d-dd76da1f02a5" xsi:nil="true"/>
+  </documentManagement>
+</p:properties>
 </file>
 
 <file path=customXml/itemProps1.xml><?xml version="1.0" encoding="utf-8"?>
-<ds:datastoreItem xmlns:ds="http://schemas.openxmlformats.org/officeDocument/2006/customXml" ds:itemID="{946BCBFB-BBC7-42F1-95CD-058E172363A0}">
+<ds:datastoreItem xmlns:ds="http://schemas.openxmlformats.org/officeDocument/2006/customXml" ds:itemID="{1259D436-C82E-43E0-8A01-53DF9CED6032}">
   <ds:schemaRefs>
-    <ds:schemaRef ds:uri="http://schemas.microsoft.com/office/2006/metadata/properties"/>
-    <ds:schemaRef ds:uri="http://schemas.microsoft.com/office/infopath/2007/PartnerControls"/>
-    <ds:schemaRef ds:uri="71af3243-3dd4-4a8d-8c0d-dd76da1f02a5"/>
+    <ds:schemaRef ds:uri="http://schemas.microsoft.com/sharepoint/v3/contenttype/forms"/>
   </ds:schemaRefs>
 </ds:datastoreItem>
 </file>
@@ -6523,9 +6874,11 @@
 </file>
 
 <file path=customXml/itemProps3.xml><?xml version="1.0" encoding="utf-8"?>
-<ds:datastoreItem xmlns:ds="http://schemas.openxmlformats.org/officeDocument/2006/customXml" ds:itemID="{1259D436-C82E-43E0-8A01-53DF9CED6032}">
+<ds:datastoreItem xmlns:ds="http://schemas.openxmlformats.org/officeDocument/2006/customXml" ds:itemID="{946BCBFB-BBC7-42F1-95CD-058E172363A0}">
   <ds:schemaRefs>
-    <ds:schemaRef ds:uri="http://schemas.microsoft.com/sharepoint/v3/contenttype/forms"/>
+    <ds:schemaRef ds:uri="http://schemas.microsoft.com/office/2006/metadata/properties"/>
+    <ds:schemaRef ds:uri="http://schemas.microsoft.com/office/infopath/2007/PartnerControls"/>
+    <ds:schemaRef ds:uri="71af3243-3dd4-4a8d-8c0d-dd76da1f02a5"/>
   </ds:schemaRefs>
 </ds:datastoreItem>
 </file>
</xml_diff>